<commit_message>
Added Checks in install-sdc
</commit_message>
<xml_diff>
--- a/labbuildr.pptx
+++ b/labbuildr.pptx
@@ -7,10 +7,10 @@
     <p:sldMasterId id="2147484024" r:id="rId6"/>
   </p:sldMasterIdLst>
   <p:notesMasterIdLst>
-    <p:notesMasterId r:id="rId25"/>
+    <p:notesMasterId r:id="rId26"/>
   </p:notesMasterIdLst>
   <p:handoutMasterIdLst>
-    <p:handoutMasterId r:id="rId26"/>
+    <p:handoutMasterId r:id="rId27"/>
   </p:handoutMasterIdLst>
   <p:sldIdLst>
     <p:sldId id="465" r:id="rId7"/>
@@ -30,7 +30,8 @@
     <p:sldId id="479" r:id="rId21"/>
     <p:sldId id="480" r:id="rId22"/>
     <p:sldId id="481" r:id="rId23"/>
-    <p:sldId id="307" r:id="rId24"/>
+    <p:sldId id="482" r:id="rId24"/>
+    <p:sldId id="307" r:id="rId25"/>
   </p:sldIdLst>
   <p:sldSz cx="9144000" cy="5143500" type="screen16x9"/>
   <p:notesSz cx="6858000" cy="9144000"/>
@@ -185,6 +186,7 @@
             <p14:sldId id="479"/>
             <p14:sldId id="480"/>
             <p14:sldId id="481"/>
+            <p14:sldId id="482"/>
             <p14:sldId id="307"/>
           </p14:sldIdLst>
         </p14:section>
@@ -20685,11 +20687,7 @@
             </a:r>
             <a:r>
               <a:rPr lang="en-US" dirty="0" err="1" smtClean="0"/>
-              <a:t>l</a:t>
-            </a:r>
-            <a:r>
-              <a:rPr lang="en-US" dirty="0" err="1" smtClean="0"/>
-              <a:t>abbuildr</a:t>
+              <a:t>labbuildr</a:t>
             </a:r>
             <a:r>
               <a:rPr lang="en-US" dirty="0" smtClean="0"/>
@@ -23590,6 +23588,98 @@
 </file>
 
 <file path=ppt/slides/slide18.xml><?xml version="1.0" encoding="utf-8"?>
+<p:sld xmlns:a="http://schemas.openxmlformats.org/drawingml/2006/main" xmlns:r="http://schemas.openxmlformats.org/officeDocument/2006/relationships" xmlns:p="http://schemas.openxmlformats.org/presentationml/2006/main">
+  <p:cSld>
+    <p:spTree>
+      <p:nvGrpSpPr>
+        <p:cNvPr id="1" name=""/>
+        <p:cNvGrpSpPr/>
+        <p:nvPr/>
+      </p:nvGrpSpPr>
+      <p:grpSpPr>
+        <a:xfrm>
+          <a:off x="0" y="0"/>
+          <a:ext cx="0" cy="0"/>
+          <a:chOff x="0" y="0"/>
+          <a:chExt cx="0" cy="0"/>
+        </a:xfrm>
+      </p:grpSpPr>
+      <p:sp>
+        <p:nvSpPr>
+          <p:cNvPr id="2" name="Title 1"/>
+          <p:cNvSpPr>
+            <a:spLocks noGrp="1"/>
+          </p:cNvSpPr>
+          <p:nvPr>
+            <p:ph type="ctrTitle"/>
+          </p:nvPr>
+        </p:nvSpPr>
+        <p:spPr/>
+        <p:txBody>
+          <a:bodyPr/>
+          <a:lstStyle/>
+          <a:p>
+            <a:r>
+              <a:rPr lang="de-DE" dirty="0" smtClean="0"/>
+              <a:t>Let us buil the First LAB, our DC</a:t>
+            </a:r>
+            <a:endParaRPr lang="de-DE" dirty="0"/>
+          </a:p>
+        </p:txBody>
+      </p:sp>
+      <p:sp>
+        <p:nvSpPr>
+          <p:cNvPr id="3" name="Content Placeholder 2"/>
+          <p:cNvSpPr>
+            <a:spLocks noGrp="1"/>
+          </p:cNvSpPr>
+          <p:nvPr>
+            <p:ph sz="quarter" idx="10"/>
+          </p:nvPr>
+        </p:nvSpPr>
+        <p:spPr/>
+        <p:txBody>
+          <a:bodyPr/>
+          <a:lstStyle/>
+          <a:p>
+            <a:r>
+              <a:rPr lang="de-DE" dirty="0" smtClean="0"/>
+              <a:t>We do a dry run using the –verbose option !</a:t>
+            </a:r>
+          </a:p>
+          <a:p>
+            <a:endParaRPr lang="de-DE" dirty="0"/>
+          </a:p>
+          <a:p>
+            <a:r>
+              <a:rPr lang="de-DE" dirty="0" smtClean="0"/>
+              <a:t>.\build-lab.ps1 –dconly –verbose –savedefaults –</a:t>
+            </a:r>
+            <a:r>
+              <a:rPr lang="de-DE" smtClean="0"/>
+              <a:t>sourcedir [usbstick]</a:t>
+            </a:r>
+            <a:endParaRPr lang="de-DE" dirty="0"/>
+          </a:p>
+        </p:txBody>
+      </p:sp>
+    </p:spTree>
+    <p:extLst>
+      <p:ext uri="{BB962C8B-B14F-4D97-AF65-F5344CB8AC3E}">
+        <p14:creationId xmlns:p14="http://schemas.microsoft.com/office/powerpoint/2010/main" val="2712878962"/>
+      </p:ext>
+    </p:extLst>
+  </p:cSld>
+  <p:clrMapOvr>
+    <a:masterClrMapping/>
+  </p:clrMapOvr>
+  <p:transition spd="med">
+    <p:fade/>
+  </p:transition>
+</p:sld>
+</file>
+
+<file path=ppt/slides/slide19.xml><?xml version="1.0" encoding="utf-8"?>
 <p:sld xmlns:a="http://schemas.openxmlformats.org/drawingml/2006/main" xmlns:r="http://schemas.openxmlformats.org/officeDocument/2006/relationships" xmlns:p="http://schemas.openxmlformats.org/presentationml/2006/main">
   <p:cSld>
     <p:spTree>
@@ -26808,21 +26898,6 @@
 </file>
 
 <file path=customXml/item1.xml><?xml version="1.0" encoding="utf-8"?>
-<?mso-contentType ?>
-<FormTemplates xmlns="http://schemas.microsoft.com/sharepoint/v3/contenttype/forms">
-  <Display>DocumentLibraryForm</Display>
-  <Edit>DocumentLibraryForm</Edit>
-  <New>DocumentLibraryForm</New>
-</FormTemplates>
-</file>
-
-<file path=customXml/item2.xml><?xml version="1.0" encoding="utf-8"?>
-<p:properties xmlns:p="http://schemas.microsoft.com/office/2006/metadata/properties" xmlns:xsi="http://www.w3.org/2001/XMLSchema-instance" xmlns:pc="http://schemas.microsoft.com/office/infopath/2007/PartnerControls">
-  <documentManagement/>
-</p:properties>
-</file>
-
-<file path=customXml/item3.xml><?xml version="1.0" encoding="utf-8"?>
 <ct:contentTypeSchema xmlns:ct="http://schemas.microsoft.com/office/2006/metadata/contentType" xmlns:ma="http://schemas.microsoft.com/office/2006/metadata/properties/metaAttributes" ct:_="" ma:_="" ma:contentTypeName="Document" ma:contentTypeID="0x01010098193F207055A548984CD1B4AFE8C329" ma:contentTypeVersion="0" ma:contentTypeDescription="Create a new document." ma:contentTypeScope="" ma:versionID="906795278a56296fe1a6ca8e02ba6266">
   <xsd:schema xmlns:xsd="http://www.w3.org/2001/XMLSchema" xmlns:xs="http://www.w3.org/2001/XMLSchema" xmlns:p="http://schemas.microsoft.com/office/2006/metadata/properties" targetNamespace="http://schemas.microsoft.com/office/2006/metadata/properties" ma:root="true" ma:fieldsID="c64490b4aec6201516c3a874156f37b2">
     <xsd:element name="properties">
@@ -26936,10 +27011,33 @@
 </ct:contentTypeSchema>
 </file>
 
+<file path=customXml/item2.xml><?xml version="1.0" encoding="utf-8"?>
+<p:properties xmlns:p="http://schemas.microsoft.com/office/2006/metadata/properties" xmlns:xsi="http://www.w3.org/2001/XMLSchema-instance" xmlns:pc="http://schemas.microsoft.com/office/infopath/2007/PartnerControls">
+  <documentManagement/>
+</p:properties>
+</file>
+
+<file path=customXml/item3.xml><?xml version="1.0" encoding="utf-8"?>
+<?mso-contentType ?>
+<FormTemplates xmlns="http://schemas.microsoft.com/sharepoint/v3/contenttype/forms">
+  <Display>DocumentLibraryForm</Display>
+  <Edit>DocumentLibraryForm</Edit>
+  <New>DocumentLibraryForm</New>
+</FormTemplates>
+</file>
+
 <file path=customXml/itemProps1.xml><?xml version="1.0" encoding="utf-8"?>
-<ds:datastoreItem xmlns:ds="http://schemas.openxmlformats.org/officeDocument/2006/customXml" ds:itemID="{FBDCBDAC-D270-4BCC-A107-BF0B272A7C3A}">
+<ds:datastoreItem xmlns:ds="http://schemas.openxmlformats.org/officeDocument/2006/customXml" ds:itemID="{1C90C646-4A5E-424D-BC26-9586236239AD}">
   <ds:schemaRefs>
-    <ds:schemaRef ds:uri="http://schemas.microsoft.com/sharepoint/v3/contenttype/forms"/>
+    <ds:schemaRef ds:uri="http://schemas.microsoft.com/office/2006/metadata/contentType"/>
+    <ds:schemaRef ds:uri="http://schemas.microsoft.com/office/2006/metadata/properties/metaAttributes"/>
+    <ds:schemaRef ds:uri="http://www.w3.org/2001/XMLSchema"/>
+    <ds:schemaRef ds:uri="http://schemas.microsoft.com/office/2006/metadata/properties"/>
+    <ds:schemaRef ds:uri="http://schemas.openxmlformats.org/package/2006/metadata/core-properties"/>
+    <ds:schemaRef ds:uri="http://purl.org/dc/elements/1.1/"/>
+    <ds:schemaRef ds:uri="http://purl.org/dc/terms/"/>
+    <ds:schemaRef ds:uri="http://schemas.microsoft.com/internal/obd"/>
+    <ds:schemaRef ds:uri="http://schemas.microsoft.com/office/infopath/2007/PartnerControls"/>
   </ds:schemaRefs>
 </ds:datastoreItem>
 </file>
@@ -26960,17 +27058,9 @@
 </file>
 
 <file path=customXml/itemProps3.xml><?xml version="1.0" encoding="utf-8"?>
-<ds:datastoreItem xmlns:ds="http://schemas.openxmlformats.org/officeDocument/2006/customXml" ds:itemID="{1C90C646-4A5E-424D-BC26-9586236239AD}">
+<ds:datastoreItem xmlns:ds="http://schemas.openxmlformats.org/officeDocument/2006/customXml" ds:itemID="{FBDCBDAC-D270-4BCC-A107-BF0B272A7C3A}">
   <ds:schemaRefs>
-    <ds:schemaRef ds:uri="http://schemas.microsoft.com/office/2006/metadata/contentType"/>
-    <ds:schemaRef ds:uri="http://schemas.microsoft.com/office/2006/metadata/properties/metaAttributes"/>
-    <ds:schemaRef ds:uri="http://www.w3.org/2001/XMLSchema"/>
-    <ds:schemaRef ds:uri="http://schemas.microsoft.com/office/2006/metadata/properties"/>
-    <ds:schemaRef ds:uri="http://schemas.openxmlformats.org/package/2006/metadata/core-properties"/>
-    <ds:schemaRef ds:uri="http://purl.org/dc/elements/1.1/"/>
-    <ds:schemaRef ds:uri="http://purl.org/dc/terms/"/>
-    <ds:schemaRef ds:uri="http://schemas.microsoft.com/internal/obd"/>
-    <ds:schemaRef ds:uri="http://schemas.microsoft.com/office/infopath/2007/PartnerControls"/>
+    <ds:schemaRef ds:uri="http://schemas.microsoft.com/sharepoint/v3/contenttype/forms"/>
   </ds:schemaRefs>
 </ds:datastoreItem>
 </file>
</xml_diff>